<commit_message>
adds lab 1 material
</commit_message>
<xml_diff>
--- a/Slides/Ders 0.pptx
+++ b/Slides/Ders 0.pptx
@@ -4485,7 +4485,15 @@
             </a:r>
             <a:r>
               <a:rPr lang="tr-TR" dirty="0"/>
-              <a:t> - GIU): Web tarayıcısında gördüğümüz grafikler.</a:t>
+              <a:t> </a:t>
+            </a:r>
+            <a:r>
+              <a:rPr lang="tr-TR"/>
+              <a:t>- GUI): </a:t>
+            </a:r>
+            <a:r>
+              <a:rPr lang="tr-TR" dirty="0"/>
+              <a:t>Web tarayıcısında gördüğümüz grafikler.</a:t>
             </a:r>
           </a:p>
           <a:p>

</xml_diff>